<commit_message>
reran ft sims with updated sigmas, generated new selection figs, added points to parameter figs
</commit_message>
<xml_diff>
--- a/figures/supp/supp2.pptx
+++ b/figures/supp/supp2.pptx
@@ -3321,12 +3321,117 @@
           <a:chExt cx="0" cy="0"/>
         </a:xfrm>
       </p:grpSpPr>
+      <p:sp>
+        <p:nvSpPr>
+          <p:cNvPr id="10" name="TextBox 9">
+            <a:extLst>
+              <a:ext uri="{FF2B5EF4-FFF2-40B4-BE49-F238E27FC236}">
+                <a16:creationId xmlns:a16="http://schemas.microsoft.com/office/drawing/2014/main" id="{3014B6FD-66B4-F007-2298-7FB240D357BE}"/>
+              </a:ext>
+            </a:extLst>
+          </p:cNvPr>
+          <p:cNvSpPr txBox="1"/>
+          <p:nvPr/>
+        </p:nvSpPr>
+        <p:spPr>
+          <a:xfrm>
+            <a:off x="2438400" y="0"/>
+            <a:ext cx="327334" cy="369332"/>
+          </a:xfrm>
+          <a:prstGeom prst="rect">
+            <a:avLst/>
+          </a:prstGeom>
+          <a:noFill/>
+        </p:spPr>
+        <p:txBody>
+          <a:bodyPr wrap="none" rtlCol="0">
+            <a:spAutoFit/>
+          </a:bodyPr>
+          <a:lstStyle/>
+          <a:p>
+            <a:r>
+              <a:rPr lang="en-US" b="1" dirty="0"/>
+              <a:t>A</a:t>
+            </a:r>
+          </a:p>
+        </p:txBody>
+      </p:sp>
+      <p:sp>
+        <p:nvSpPr>
+          <p:cNvPr id="11" name="TextBox 10">
+            <a:extLst>
+              <a:ext uri="{FF2B5EF4-FFF2-40B4-BE49-F238E27FC236}">
+                <a16:creationId xmlns:a16="http://schemas.microsoft.com/office/drawing/2014/main" id="{79A18E9C-9886-66E5-6333-EE300B2CC14C}"/>
+              </a:ext>
+            </a:extLst>
+          </p:cNvPr>
+          <p:cNvSpPr txBox="1"/>
+          <p:nvPr/>
+        </p:nvSpPr>
+        <p:spPr>
+          <a:xfrm>
+            <a:off x="6096000" y="0"/>
+            <a:ext cx="327334" cy="369332"/>
+          </a:xfrm>
+          <a:prstGeom prst="rect">
+            <a:avLst/>
+          </a:prstGeom>
+          <a:noFill/>
+        </p:spPr>
+        <p:txBody>
+          <a:bodyPr wrap="none" rtlCol="0">
+            <a:spAutoFit/>
+          </a:bodyPr>
+          <a:lstStyle/>
+          <a:p>
+            <a:r>
+              <a:rPr lang="en-US" b="1" dirty="0"/>
+              <a:t>B</a:t>
+            </a:r>
+          </a:p>
+        </p:txBody>
+      </p:sp>
+      <p:sp>
+        <p:nvSpPr>
+          <p:cNvPr id="12" name="TextBox 11">
+            <a:extLst>
+              <a:ext uri="{FF2B5EF4-FFF2-40B4-BE49-F238E27FC236}">
+                <a16:creationId xmlns:a16="http://schemas.microsoft.com/office/drawing/2014/main" id="{27283FB3-EDEF-8C3E-B6CC-A0DEC480EC86}"/>
+              </a:ext>
+            </a:extLst>
+          </p:cNvPr>
+          <p:cNvSpPr txBox="1"/>
+          <p:nvPr/>
+        </p:nvSpPr>
+        <p:spPr>
+          <a:xfrm>
+            <a:off x="6096000" y="3244334"/>
+            <a:ext cx="344966" cy="369332"/>
+          </a:xfrm>
+          <a:prstGeom prst="rect">
+            <a:avLst/>
+          </a:prstGeom>
+          <a:noFill/>
+        </p:spPr>
+        <p:txBody>
+          <a:bodyPr wrap="none" rtlCol="0">
+            <a:spAutoFit/>
+          </a:bodyPr>
+          <a:lstStyle/>
+          <a:p>
+            <a:r>
+              <a:rPr lang="en-US" b="1" dirty="0"/>
+              <a:t>C</a:t>
+            </a:r>
+          </a:p>
+        </p:txBody>
+      </p:sp>
       <p:pic>
         <p:nvPicPr>
-          <p:cNvPr id="5" name="Picture 4">
-            <a:extLst>
-              <a:ext uri="{FF2B5EF4-FFF2-40B4-BE49-F238E27FC236}">
-                <a16:creationId xmlns:a16="http://schemas.microsoft.com/office/drawing/2014/main" id="{21C84AE3-91A1-F87D-C825-57D36EA81305}"/>
+          <p:cNvPr id="14" name="Picture 13">
+            <a:extLst>
+              <a:ext uri="{FF2B5EF4-FFF2-40B4-BE49-F238E27FC236}">
+                <a16:creationId xmlns:a16="http://schemas.microsoft.com/office/drawing/2014/main" id="{65124431-1767-9197-1294-3BA184856D9D}"/>
               </a:ext>
             </a:extLst>
           </p:cNvPr>
@@ -3343,7 +3448,7 @@
         </p:blipFill>
         <p:spPr>
           <a:xfrm>
-            <a:off x="2438400" y="-86499"/>
+            <a:off x="2602067" y="-228600"/>
             <a:ext cx="3657600" cy="3657600"/>
           </a:xfrm>
           <a:prstGeom prst="rect">
@@ -3353,10 +3458,10 @@
       </p:pic>
       <p:pic>
         <p:nvPicPr>
-          <p:cNvPr id="7" name="Picture 6">
-            <a:extLst>
-              <a:ext uri="{FF2B5EF4-FFF2-40B4-BE49-F238E27FC236}">
-                <a16:creationId xmlns:a16="http://schemas.microsoft.com/office/drawing/2014/main" id="{7FD1DF60-ABE7-7F27-18D5-49DC2720FD36}"/>
+          <p:cNvPr id="16" name="Picture 15">
+            <a:extLst>
+              <a:ext uri="{FF2B5EF4-FFF2-40B4-BE49-F238E27FC236}">
+                <a16:creationId xmlns:a16="http://schemas.microsoft.com/office/drawing/2014/main" id="{01EC81C3-4C99-AAE5-2FDF-A370DC431326}"/>
               </a:ext>
             </a:extLst>
           </p:cNvPr>
@@ -3373,7 +3478,7 @@
         </p:blipFill>
         <p:spPr>
           <a:xfrm>
-            <a:off x="6096000" y="-86499"/>
+            <a:off x="6277299" y="-228600"/>
             <a:ext cx="3657600" cy="3657600"/>
           </a:xfrm>
           <a:prstGeom prst="rect">
@@ -3383,10 +3488,10 @@
       </p:pic>
       <p:pic>
         <p:nvPicPr>
-          <p:cNvPr id="9" name="Picture 8">
-            <a:extLst>
-              <a:ext uri="{FF2B5EF4-FFF2-40B4-BE49-F238E27FC236}">
-                <a16:creationId xmlns:a16="http://schemas.microsoft.com/office/drawing/2014/main" id="{A962618C-1FE7-1C73-152C-98E13012AE79}"/>
+          <p:cNvPr id="18" name="Picture 17">
+            <a:extLst>
+              <a:ext uri="{FF2B5EF4-FFF2-40B4-BE49-F238E27FC236}">
+                <a16:creationId xmlns:a16="http://schemas.microsoft.com/office/drawing/2014/main" id="{81AEBECF-2E65-A8C4-1175-78FBE9B88DC6}"/>
               </a:ext>
             </a:extLst>
           </p:cNvPr>
@@ -3403,7 +3508,7 @@
         </p:blipFill>
         <p:spPr>
           <a:xfrm>
-            <a:off x="6096000" y="3200400"/>
+            <a:off x="6277299" y="3037701"/>
             <a:ext cx="3657600" cy="3657600"/>
           </a:xfrm>
           <a:prstGeom prst="rect">
@@ -3411,111 +3516,6 @@
           </a:prstGeom>
         </p:spPr>
       </p:pic>
-      <p:sp>
-        <p:nvSpPr>
-          <p:cNvPr id="10" name="TextBox 9">
-            <a:extLst>
-              <a:ext uri="{FF2B5EF4-FFF2-40B4-BE49-F238E27FC236}">
-                <a16:creationId xmlns:a16="http://schemas.microsoft.com/office/drawing/2014/main" id="{3014B6FD-66B4-F007-2298-7FB240D357BE}"/>
-              </a:ext>
-            </a:extLst>
-          </p:cNvPr>
-          <p:cNvSpPr txBox="1"/>
-          <p:nvPr/>
-        </p:nvSpPr>
-        <p:spPr>
-          <a:xfrm>
-            <a:off x="2438400" y="0"/>
-            <a:ext cx="327334" cy="369332"/>
-          </a:xfrm>
-          <a:prstGeom prst="rect">
-            <a:avLst/>
-          </a:prstGeom>
-          <a:noFill/>
-        </p:spPr>
-        <p:txBody>
-          <a:bodyPr wrap="none" rtlCol="0">
-            <a:spAutoFit/>
-          </a:bodyPr>
-          <a:lstStyle/>
-          <a:p>
-            <a:r>
-              <a:rPr lang="en-US" b="1" dirty="0"/>
-              <a:t>A</a:t>
-            </a:r>
-          </a:p>
-        </p:txBody>
-      </p:sp>
-      <p:sp>
-        <p:nvSpPr>
-          <p:cNvPr id="11" name="TextBox 10">
-            <a:extLst>
-              <a:ext uri="{FF2B5EF4-FFF2-40B4-BE49-F238E27FC236}">
-                <a16:creationId xmlns:a16="http://schemas.microsoft.com/office/drawing/2014/main" id="{79A18E9C-9886-66E5-6333-EE300B2CC14C}"/>
-              </a:ext>
-            </a:extLst>
-          </p:cNvPr>
-          <p:cNvSpPr txBox="1"/>
-          <p:nvPr/>
-        </p:nvSpPr>
-        <p:spPr>
-          <a:xfrm>
-            <a:off x="6096000" y="0"/>
-            <a:ext cx="327334" cy="369332"/>
-          </a:xfrm>
-          <a:prstGeom prst="rect">
-            <a:avLst/>
-          </a:prstGeom>
-          <a:noFill/>
-        </p:spPr>
-        <p:txBody>
-          <a:bodyPr wrap="none" rtlCol="0">
-            <a:spAutoFit/>
-          </a:bodyPr>
-          <a:lstStyle/>
-          <a:p>
-            <a:r>
-              <a:rPr lang="en-US" b="1" dirty="0"/>
-              <a:t>B</a:t>
-            </a:r>
-          </a:p>
-        </p:txBody>
-      </p:sp>
-      <p:sp>
-        <p:nvSpPr>
-          <p:cNvPr id="12" name="TextBox 11">
-            <a:extLst>
-              <a:ext uri="{FF2B5EF4-FFF2-40B4-BE49-F238E27FC236}">
-                <a16:creationId xmlns:a16="http://schemas.microsoft.com/office/drawing/2014/main" id="{27283FB3-EDEF-8C3E-B6CC-A0DEC480EC86}"/>
-              </a:ext>
-            </a:extLst>
-          </p:cNvPr>
-          <p:cNvSpPr txBox="1"/>
-          <p:nvPr/>
-        </p:nvSpPr>
-        <p:spPr>
-          <a:xfrm>
-            <a:off x="6096000" y="3244334"/>
-            <a:ext cx="344966" cy="369332"/>
-          </a:xfrm>
-          <a:prstGeom prst="rect">
-            <a:avLst/>
-          </a:prstGeom>
-          <a:noFill/>
-        </p:spPr>
-        <p:txBody>
-          <a:bodyPr wrap="none" rtlCol="0">
-            <a:spAutoFit/>
-          </a:bodyPr>
-          <a:lstStyle/>
-          <a:p>
-            <a:r>
-              <a:rPr lang="en-US" b="1" dirty="0"/>
-              <a:t>C</a:t>
-            </a:r>
-          </a:p>
-        </p:txBody>
-      </p:sp>
     </p:spTree>
     <p:extLst>
       <p:ext uri="{BB962C8B-B14F-4D97-AF65-F5344CB8AC3E}">

</xml_diff>